<commit_message>
worked on lectures 2&3 and assignment 2
</commit_message>
<xml_diff>
--- a/sessions/03-probability_decision_trees/making_figs.pptx
+++ b/sessions/03-probability_decision_trees/making_figs.pptx
@@ -128,7 +128,7 @@
   <pc:docChgLst>
     <pc:chgData name="Alton Russell, Prof." userId="06708d83-fc2b-4190-b0c8-dc9a4695075b" providerId="ADAL" clId="{642D8EB8-F0D6-3842-8490-0CD7867CF0A1}"/>
     <pc:docChg chg="undo custSel addSld modSld">
-      <pc:chgData name="Alton Russell, Prof." userId="06708d83-fc2b-4190-b0c8-dc9a4695075b" providerId="ADAL" clId="{642D8EB8-F0D6-3842-8490-0CD7867CF0A1}" dt="2023-01-04T00:42:58.774" v="118" actId="1035"/>
+      <pc:chgData name="Alton Russell, Prof." userId="06708d83-fc2b-4190-b0c8-dc9a4695075b" providerId="ADAL" clId="{642D8EB8-F0D6-3842-8490-0CD7867CF0A1}" dt="2023-01-05T20:07:51.185" v="120" actId="20577"/>
       <pc:docMkLst>
         <pc:docMk/>
       </pc:docMkLst>
@@ -227,13 +227,13 @@
         </pc:picChg>
       </pc:sldChg>
       <pc:sldChg chg="addSp delSp modSp new mod">
-        <pc:chgData name="Alton Russell, Prof." userId="06708d83-fc2b-4190-b0c8-dc9a4695075b" providerId="ADAL" clId="{642D8EB8-F0D6-3842-8490-0CD7867CF0A1}" dt="2023-01-04T00:42:58.774" v="118" actId="1035"/>
+        <pc:chgData name="Alton Russell, Prof." userId="06708d83-fc2b-4190-b0c8-dc9a4695075b" providerId="ADAL" clId="{642D8EB8-F0D6-3842-8490-0CD7867CF0A1}" dt="2023-01-05T20:07:51.185" v="120" actId="20577"/>
         <pc:sldMkLst>
           <pc:docMk/>
           <pc:sldMk cId="956310125" sldId="259"/>
         </pc:sldMkLst>
         <pc:spChg chg="mod">
-          <ac:chgData name="Alton Russell, Prof." userId="06708d83-fc2b-4190-b0c8-dc9a4695075b" providerId="ADAL" clId="{642D8EB8-F0D6-3842-8490-0CD7867CF0A1}" dt="2023-01-04T00:42:52.047" v="115" actId="1038"/>
+          <ac:chgData name="Alton Russell, Prof." userId="06708d83-fc2b-4190-b0c8-dc9a4695075b" providerId="ADAL" clId="{642D8EB8-F0D6-3842-8490-0CD7867CF0A1}" dt="2023-01-05T20:07:51.185" v="120" actId="20577"/>
           <ac:spMkLst>
             <pc:docMk/>
             <pc:sldMk cId="956310125" sldId="259"/>
@@ -425,7 +425,7 @@
           <a:p>
             <a:fld id="{D68DD99B-8D91-A844-BA3A-B2A40D21540E}" type="datetimeFigureOut">
               <a:rPr lang="en-US" smtClean="0"/>
-              <a:t>1/3/23</a:t>
+              <a:t>1/5/23</a:t>
             </a:fld>
             <a:endParaRPr lang="en-US"/>
           </a:p>
@@ -623,7 +623,7 @@
           <a:p>
             <a:fld id="{D68DD99B-8D91-A844-BA3A-B2A40D21540E}" type="datetimeFigureOut">
               <a:rPr lang="en-US" smtClean="0"/>
-              <a:t>1/3/23</a:t>
+              <a:t>1/5/23</a:t>
             </a:fld>
             <a:endParaRPr lang="en-US"/>
           </a:p>
@@ -831,7 +831,7 @@
           <a:p>
             <a:fld id="{D68DD99B-8D91-A844-BA3A-B2A40D21540E}" type="datetimeFigureOut">
               <a:rPr lang="en-US" smtClean="0"/>
-              <a:t>1/3/23</a:t>
+              <a:t>1/5/23</a:t>
             </a:fld>
             <a:endParaRPr lang="en-US"/>
           </a:p>
@@ -1029,7 +1029,7 @@
           <a:p>
             <a:fld id="{D68DD99B-8D91-A844-BA3A-B2A40D21540E}" type="datetimeFigureOut">
               <a:rPr lang="en-US" smtClean="0"/>
-              <a:t>1/3/23</a:t>
+              <a:t>1/5/23</a:t>
             </a:fld>
             <a:endParaRPr lang="en-US"/>
           </a:p>
@@ -1304,7 +1304,7 @@
           <a:p>
             <a:fld id="{D68DD99B-8D91-A844-BA3A-B2A40D21540E}" type="datetimeFigureOut">
               <a:rPr lang="en-US" smtClean="0"/>
-              <a:t>1/3/23</a:t>
+              <a:t>1/5/23</a:t>
             </a:fld>
             <a:endParaRPr lang="en-US"/>
           </a:p>
@@ -1569,7 +1569,7 @@
           <a:p>
             <a:fld id="{D68DD99B-8D91-A844-BA3A-B2A40D21540E}" type="datetimeFigureOut">
               <a:rPr lang="en-US" smtClean="0"/>
-              <a:t>1/3/23</a:t>
+              <a:t>1/5/23</a:t>
             </a:fld>
             <a:endParaRPr lang="en-US"/>
           </a:p>
@@ -1981,7 +1981,7 @@
           <a:p>
             <a:fld id="{D68DD99B-8D91-A844-BA3A-B2A40D21540E}" type="datetimeFigureOut">
               <a:rPr lang="en-US" smtClean="0"/>
-              <a:t>1/3/23</a:t>
+              <a:t>1/5/23</a:t>
             </a:fld>
             <a:endParaRPr lang="en-US"/>
           </a:p>
@@ -2122,7 +2122,7 @@
           <a:p>
             <a:fld id="{D68DD99B-8D91-A844-BA3A-B2A40D21540E}" type="datetimeFigureOut">
               <a:rPr lang="en-US" smtClean="0"/>
-              <a:t>1/3/23</a:t>
+              <a:t>1/5/23</a:t>
             </a:fld>
             <a:endParaRPr lang="en-US"/>
           </a:p>
@@ -2235,7 +2235,7 @@
           <a:p>
             <a:fld id="{D68DD99B-8D91-A844-BA3A-B2A40D21540E}" type="datetimeFigureOut">
               <a:rPr lang="en-US" smtClean="0"/>
-              <a:t>1/3/23</a:t>
+              <a:t>1/5/23</a:t>
             </a:fld>
             <a:endParaRPr lang="en-US"/>
           </a:p>
@@ -2546,7 +2546,7 @@
           <a:p>
             <a:fld id="{D68DD99B-8D91-A844-BA3A-B2A40D21540E}" type="datetimeFigureOut">
               <a:rPr lang="en-US" smtClean="0"/>
-              <a:t>1/3/23</a:t>
+              <a:t>1/5/23</a:t>
             </a:fld>
             <a:endParaRPr lang="en-US"/>
           </a:p>
@@ -2834,7 +2834,7 @@
           <a:p>
             <a:fld id="{D68DD99B-8D91-A844-BA3A-B2A40D21540E}" type="datetimeFigureOut">
               <a:rPr lang="en-US" smtClean="0"/>
-              <a:t>1/3/23</a:t>
+              <a:t>1/5/23</a:t>
             </a:fld>
             <a:endParaRPr lang="en-US"/>
           </a:p>
@@ -3075,7 +3075,7 @@
           <a:p>
             <a:fld id="{D68DD99B-8D91-A844-BA3A-B2A40D21540E}" type="datetimeFigureOut">
               <a:rPr lang="en-US" smtClean="0"/>
-              <a:t>1/3/23</a:t>
+              <a:t>1/5/23</a:t>
             </a:fld>
             <a:endParaRPr lang="en-US"/>
           </a:p>
@@ -4561,7 +4561,7 @@
             </a:pPr>
             <a:r>
               <a:rPr lang="en-US" dirty="0"/>
-              <a:t>Change node</a:t>
+              <a:t>Chance node</a:t>
             </a:r>
           </a:p>
           <a:p>

</xml_diff>